<commit_message>
working PWM, added documentation
</commit_message>
<xml_diff>
--- a/PowerPoint Doku.pptx
+++ b/PowerPoint Doku.pptx
@@ -8,6 +8,8 @@
     <p:sldId id="256" r:id="rId2"/>
     <p:sldId id="257" r:id="rId3"/>
     <p:sldId id="258" r:id="rId4"/>
+    <p:sldId id="259" r:id="rId5"/>
+    <p:sldId id="260" r:id="rId6"/>
   </p:sldIdLst>
   <p:sldSz cx="12192000" cy="6858000"/>
   <p:notesSz cx="6858000" cy="9144000"/>
@@ -261,7 +263,7 @@
           <a:p>
             <a:fld id="{0EB00B2A-D511-467E-A405-99BA8CFAAC58}" type="datetimeFigureOut">
               <a:rPr lang="de-DE" smtClean="0"/>
-              <a:t>24.05.2022</a:t>
+              <a:t>25.05.2022</a:t>
             </a:fld>
             <a:endParaRPr lang="de-DE"/>
           </a:p>
@@ -459,7 +461,7 @@
           <a:p>
             <a:fld id="{0EB00B2A-D511-467E-A405-99BA8CFAAC58}" type="datetimeFigureOut">
               <a:rPr lang="de-DE" smtClean="0"/>
-              <a:t>24.05.2022</a:t>
+              <a:t>25.05.2022</a:t>
             </a:fld>
             <a:endParaRPr lang="de-DE"/>
           </a:p>
@@ -667,7 +669,7 @@
           <a:p>
             <a:fld id="{0EB00B2A-D511-467E-A405-99BA8CFAAC58}" type="datetimeFigureOut">
               <a:rPr lang="de-DE" smtClean="0"/>
-              <a:t>24.05.2022</a:t>
+              <a:t>25.05.2022</a:t>
             </a:fld>
             <a:endParaRPr lang="de-DE"/>
           </a:p>
@@ -865,7 +867,7 @@
           <a:p>
             <a:fld id="{0EB00B2A-D511-467E-A405-99BA8CFAAC58}" type="datetimeFigureOut">
               <a:rPr lang="de-DE" smtClean="0"/>
-              <a:t>24.05.2022</a:t>
+              <a:t>25.05.2022</a:t>
             </a:fld>
             <a:endParaRPr lang="de-DE"/>
           </a:p>
@@ -1140,7 +1142,7 @@
           <a:p>
             <a:fld id="{0EB00B2A-D511-467E-A405-99BA8CFAAC58}" type="datetimeFigureOut">
               <a:rPr lang="de-DE" smtClean="0"/>
-              <a:t>24.05.2022</a:t>
+              <a:t>25.05.2022</a:t>
             </a:fld>
             <a:endParaRPr lang="de-DE"/>
           </a:p>
@@ -1405,7 +1407,7 @@
           <a:p>
             <a:fld id="{0EB00B2A-D511-467E-A405-99BA8CFAAC58}" type="datetimeFigureOut">
               <a:rPr lang="de-DE" smtClean="0"/>
-              <a:t>24.05.2022</a:t>
+              <a:t>25.05.2022</a:t>
             </a:fld>
             <a:endParaRPr lang="de-DE"/>
           </a:p>
@@ -1817,7 +1819,7 @@
           <a:p>
             <a:fld id="{0EB00B2A-D511-467E-A405-99BA8CFAAC58}" type="datetimeFigureOut">
               <a:rPr lang="de-DE" smtClean="0"/>
-              <a:t>24.05.2022</a:t>
+              <a:t>25.05.2022</a:t>
             </a:fld>
             <a:endParaRPr lang="de-DE"/>
           </a:p>
@@ -1958,7 +1960,7 @@
           <a:p>
             <a:fld id="{0EB00B2A-D511-467E-A405-99BA8CFAAC58}" type="datetimeFigureOut">
               <a:rPr lang="de-DE" smtClean="0"/>
-              <a:t>24.05.2022</a:t>
+              <a:t>25.05.2022</a:t>
             </a:fld>
             <a:endParaRPr lang="de-DE"/>
           </a:p>
@@ -2071,7 +2073,7 @@
           <a:p>
             <a:fld id="{0EB00B2A-D511-467E-A405-99BA8CFAAC58}" type="datetimeFigureOut">
               <a:rPr lang="de-DE" smtClean="0"/>
-              <a:t>24.05.2022</a:t>
+              <a:t>25.05.2022</a:t>
             </a:fld>
             <a:endParaRPr lang="de-DE"/>
           </a:p>
@@ -2382,7 +2384,7 @@
           <a:p>
             <a:fld id="{0EB00B2A-D511-467E-A405-99BA8CFAAC58}" type="datetimeFigureOut">
               <a:rPr lang="de-DE" smtClean="0"/>
-              <a:t>24.05.2022</a:t>
+              <a:t>25.05.2022</a:t>
             </a:fld>
             <a:endParaRPr lang="de-DE"/>
           </a:p>
@@ -2670,7 +2672,7 @@
           <a:p>
             <a:fld id="{0EB00B2A-D511-467E-A405-99BA8CFAAC58}" type="datetimeFigureOut">
               <a:rPr lang="de-DE" smtClean="0"/>
-              <a:t>24.05.2022</a:t>
+              <a:t>25.05.2022</a:t>
             </a:fld>
             <a:endParaRPr lang="de-DE"/>
           </a:p>
@@ -2911,7 +2913,7 @@
           <a:p>
             <a:fld id="{0EB00B2A-D511-467E-A405-99BA8CFAAC58}" type="datetimeFigureOut">
               <a:rPr lang="de-DE" smtClean="0"/>
-              <a:t>24.05.2022</a:t>
+              <a:t>25.05.2022</a:t>
             </a:fld>
             <a:endParaRPr lang="de-DE"/>
           </a:p>
@@ -3632,6 +3634,409 @@
 </p:sld>
 </file>
 
+<file path=ppt/slides/slide4.xml><?xml version="1.0" encoding="utf-8"?>
+<p:sld xmlns:a="http://schemas.openxmlformats.org/drawingml/2006/main" xmlns:r="http://schemas.openxmlformats.org/officeDocument/2006/relationships" xmlns:p="http://schemas.openxmlformats.org/presentationml/2006/main">
+  <p:cSld>
+    <p:spTree>
+      <p:nvGrpSpPr>
+        <p:cNvPr id="1" name=""/>
+        <p:cNvGrpSpPr/>
+        <p:nvPr/>
+      </p:nvGrpSpPr>
+      <p:grpSpPr>
+        <a:xfrm>
+          <a:off x="0" y="0"/>
+          <a:ext cx="0" cy="0"/>
+          <a:chOff x="0" y="0"/>
+          <a:chExt cx="0" cy="0"/>
+        </a:xfrm>
+      </p:grpSpPr>
+      <p:sp>
+        <p:nvSpPr>
+          <p:cNvPr id="2" name="Titel 1">
+            <a:extLst>
+              <a:ext uri="{FF2B5EF4-FFF2-40B4-BE49-F238E27FC236}">
+                <a16:creationId xmlns:a16="http://schemas.microsoft.com/office/drawing/2014/main" id="{72FE76E6-150C-3A6C-FCE5-04F08642701A}"/>
+              </a:ext>
+            </a:extLst>
+          </p:cNvPr>
+          <p:cNvSpPr>
+            <a:spLocks noGrp="1"/>
+          </p:cNvSpPr>
+          <p:nvPr>
+            <p:ph type="title"/>
+          </p:nvPr>
+        </p:nvSpPr>
+        <p:spPr/>
+        <p:txBody>
+          <a:bodyPr/>
+          <a:lstStyle/>
+          <a:p>
+            <a:r>
+              <a:rPr lang="de-DE" dirty="0"/>
+              <a:t>PWM über </a:t>
+            </a:r>
+            <a:r>
+              <a:rPr lang="de-DE" dirty="0" err="1"/>
+              <a:t>Timer</a:t>
+            </a:r>
+            <a:r>
+              <a:rPr lang="de-DE" dirty="0"/>
+              <a:t>/Counter1</a:t>
+            </a:r>
+          </a:p>
+        </p:txBody>
+      </p:sp>
+      <mc:AlternateContent xmlns:mc="http://schemas.openxmlformats.org/markup-compatibility/2006">
+        <mc:Choice xmlns:a14="http://schemas.microsoft.com/office/drawing/2010/main" Requires="a14">
+          <p:sp>
+            <p:nvSpPr>
+              <p:cNvPr id="3" name="Inhaltsplatzhalter 2">
+                <a:extLst>
+                  <a:ext uri="{FF2B5EF4-FFF2-40B4-BE49-F238E27FC236}">
+                    <a16:creationId xmlns:a16="http://schemas.microsoft.com/office/drawing/2014/main" id="{B4EA8C8C-094A-78D7-0E30-9B150F5BA2E1}"/>
+                  </a:ext>
+                </a:extLst>
+              </p:cNvPr>
+              <p:cNvSpPr>
+                <a:spLocks noGrp="1"/>
+              </p:cNvSpPr>
+              <p:nvPr>
+                <p:ph idx="1"/>
+              </p:nvPr>
+            </p:nvSpPr>
+            <p:spPr/>
+            <p:txBody>
+              <a:bodyPr/>
+              <a:lstStyle/>
+              <a:p>
+                <a:pPr marL="0" indent="0">
+                  <a:buNone/>
+                </a:pPr>
+                <a14:m>
+                  <m:oMathPara xmlns:m="http://schemas.openxmlformats.org/officeDocument/2006/math">
+                    <m:oMathParaPr>
+                      <m:jc m:val="center"/>
+                    </m:oMathParaPr>
+                    <m:oMath xmlns:m="http://schemas.openxmlformats.org/officeDocument/2006/math">
+                      <m:sSub>
+                        <m:sSubPr>
+                          <m:ctrlPr>
+                            <a:rPr lang="de-DE" b="0" i="1" smtClean="0">
+                              <a:latin typeface="Cambria Math" panose="02040503050406030204" pitchFamily="18" charset="0"/>
+                            </a:rPr>
+                          </m:ctrlPr>
+                        </m:sSubPr>
+                        <m:e>
+                          <m:r>
+                            <a:rPr lang="de-DE" b="0" i="1" smtClean="0">
+                              <a:latin typeface="Cambria Math" panose="02040503050406030204" pitchFamily="18" charset="0"/>
+                            </a:rPr>
+                            <m:t>𝐹</m:t>
+                          </m:r>
+                        </m:e>
+                        <m:sub>
+                          <m:r>
+                            <a:rPr lang="de-DE" b="0" i="1" smtClean="0">
+                              <a:latin typeface="Cambria Math" panose="02040503050406030204" pitchFamily="18" charset="0"/>
+                            </a:rPr>
+                            <m:t>𝑃𝑊𝑀</m:t>
+                          </m:r>
+                        </m:sub>
+                      </m:sSub>
+                      <m:r>
+                        <a:rPr lang="de-DE" b="0" i="1" smtClean="0">
+                          <a:latin typeface="Cambria Math" panose="02040503050406030204" pitchFamily="18" charset="0"/>
+                        </a:rPr>
+                        <m:t>=</m:t>
+                      </m:r>
+                      <m:f>
+                        <m:fPr>
+                          <m:ctrlPr>
+                            <a:rPr lang="de-DE" b="0" i="1" smtClean="0">
+                              <a:latin typeface="Cambria Math" panose="02040503050406030204" pitchFamily="18" charset="0"/>
+                            </a:rPr>
+                          </m:ctrlPr>
+                        </m:fPr>
+                        <m:num>
+                          <m:sSub>
+                            <m:sSubPr>
+                              <m:ctrlPr>
+                                <a:rPr lang="de-DE" b="0" i="1" smtClean="0">
+                                  <a:latin typeface="Cambria Math" panose="02040503050406030204" pitchFamily="18" charset="0"/>
+                                </a:rPr>
+                              </m:ctrlPr>
+                            </m:sSubPr>
+                            <m:e>
+                              <m:r>
+                                <a:rPr lang="de-DE" b="0" i="1" smtClean="0">
+                                  <a:latin typeface="Cambria Math" panose="02040503050406030204" pitchFamily="18" charset="0"/>
+                                </a:rPr>
+                                <m:t>𝐹</m:t>
+                              </m:r>
+                            </m:e>
+                            <m:sub>
+                              <m:r>
+                                <a:rPr lang="de-DE" b="0" i="1" smtClean="0">
+                                  <a:latin typeface="Cambria Math" panose="02040503050406030204" pitchFamily="18" charset="0"/>
+                                </a:rPr>
+                                <m:t>𝐶𝑃𝑈</m:t>
+                              </m:r>
+                            </m:sub>
+                          </m:sSub>
+                        </m:num>
+                        <m:den>
+                          <m:r>
+                            <a:rPr lang="de-DE" b="0" i="1" smtClean="0">
+                              <a:latin typeface="Cambria Math" panose="02040503050406030204" pitchFamily="18" charset="0"/>
+                            </a:rPr>
+                            <m:t>𝑁</m:t>
+                          </m:r>
+                          <m:r>
+                            <a:rPr lang="de-DE" b="0" i="1" smtClean="0">
+                              <a:latin typeface="Cambria Math" panose="02040503050406030204" pitchFamily="18" charset="0"/>
+                            </a:rPr>
+                            <m:t>⋅(</m:t>
+                          </m:r>
+                          <m:r>
+                            <a:rPr lang="de-DE" b="0" i="1" smtClean="0">
+                              <a:latin typeface="Cambria Math" panose="02040503050406030204" pitchFamily="18" charset="0"/>
+                            </a:rPr>
+                            <m:t>𝑇𝑂𝑃</m:t>
+                          </m:r>
+                          <m:r>
+                            <a:rPr lang="de-DE" b="0" i="1" smtClean="0">
+                              <a:latin typeface="Cambria Math" panose="02040503050406030204" pitchFamily="18" charset="0"/>
+                            </a:rPr>
+                            <m:t>+1)</m:t>
+                          </m:r>
+                        </m:den>
+                      </m:f>
+                    </m:oMath>
+                  </m:oMathPara>
+                </a14:m>
+                <a:endParaRPr lang="de-DE" dirty="0"/>
+              </a:p>
+              <a:p>
+                <a:pPr/>
+                <a:r>
+                  <a:rPr lang="de-DE" dirty="0"/>
+                  <a:t>Es wird eine mindestens so gute Auflösung wie bei der AD-Wandlung benötigt </a:t>
+                </a:r>
+                <a:r>
+                  <a:rPr lang="de-DE" dirty="0">
+                    <a:sym typeface="Wingdings" panose="05000000000000000000" pitchFamily="2" charset="2"/>
+                  </a:rPr>
+                  <a:t> 11 Bit  TOP = 0x07FF</a:t>
+                </a:r>
+                <a:endParaRPr lang="de-DE" dirty="0"/>
+              </a:p>
+              <a:p>
+                <a:r>
+                  <a:rPr lang="de-DE" dirty="0"/>
+                  <a:t>Mit einem </a:t>
+                </a:r>
+                <a:r>
+                  <a:rPr lang="de-DE" dirty="0" err="1"/>
+                  <a:t>prescaler</a:t>
+                </a:r>
+                <a:r>
+                  <a:rPr lang="de-DE" dirty="0"/>
+                  <a:t> von 8 ergibt sich eine Frequenz von 225 Hz. </a:t>
+                </a:r>
+              </a:p>
+            </p:txBody>
+          </p:sp>
+        </mc:Choice>
+        <mc:Fallback>
+          <p:sp>
+            <p:nvSpPr>
+              <p:cNvPr id="3" name="Inhaltsplatzhalter 2">
+                <a:extLst>
+                  <a:ext uri="{FF2B5EF4-FFF2-40B4-BE49-F238E27FC236}">
+                    <a16:creationId xmlns:a16="http://schemas.microsoft.com/office/drawing/2014/main" id="{B4EA8C8C-094A-78D7-0E30-9B150F5BA2E1}"/>
+                  </a:ext>
+                </a:extLst>
+              </p:cNvPr>
+              <p:cNvSpPr>
+                <a:spLocks noGrp="1" noRot="1" noChangeAspect="1" noMove="1" noResize="1" noEditPoints="1" noAdjustHandles="1" noChangeArrowheads="1" noChangeShapeType="1" noTextEdit="1"/>
+              </p:cNvSpPr>
+              <p:nvPr>
+                <p:ph idx="1"/>
+              </p:nvPr>
+            </p:nvSpPr>
+            <p:spPr>
+              <a:blipFill>
+                <a:blip r:embed="rId2"/>
+                <a:stretch>
+                  <a:fillRect l="-1043" r="-290"/>
+                </a:stretch>
+              </a:blipFill>
+            </p:spPr>
+            <p:txBody>
+              <a:bodyPr/>
+              <a:lstStyle/>
+              <a:p>
+                <a:r>
+                  <a:rPr lang="de-DE">
+                    <a:noFill/>
+                  </a:rPr>
+                  <a:t> </a:t>
+                </a:r>
+              </a:p>
+            </p:txBody>
+          </p:sp>
+        </mc:Fallback>
+      </mc:AlternateContent>
+    </p:spTree>
+    <p:extLst>
+      <p:ext uri="{BB962C8B-B14F-4D97-AF65-F5344CB8AC3E}">
+        <p14:creationId xmlns:p14="http://schemas.microsoft.com/office/powerpoint/2010/main" val="3052630277"/>
+      </p:ext>
+    </p:extLst>
+  </p:cSld>
+  <p:clrMapOvr>
+    <a:masterClrMapping/>
+  </p:clrMapOvr>
+</p:sld>
+</file>
+
+<file path=ppt/slides/slide5.xml><?xml version="1.0" encoding="utf-8"?>
+<p:sld xmlns:a="http://schemas.openxmlformats.org/drawingml/2006/main" xmlns:r="http://schemas.openxmlformats.org/officeDocument/2006/relationships" xmlns:p="http://schemas.openxmlformats.org/presentationml/2006/main">
+  <p:cSld>
+    <p:spTree>
+      <p:nvGrpSpPr>
+        <p:cNvPr id="1" name=""/>
+        <p:cNvGrpSpPr/>
+        <p:nvPr/>
+      </p:nvGrpSpPr>
+      <p:grpSpPr>
+        <a:xfrm>
+          <a:off x="0" y="0"/>
+          <a:ext cx="0" cy="0"/>
+          <a:chOff x="0" y="0"/>
+          <a:chExt cx="0" cy="0"/>
+        </a:xfrm>
+      </p:grpSpPr>
+      <p:sp>
+        <p:nvSpPr>
+          <p:cNvPr id="4" name="Titel 3">
+            <a:extLst>
+              <a:ext uri="{FF2B5EF4-FFF2-40B4-BE49-F238E27FC236}">
+                <a16:creationId xmlns:a16="http://schemas.microsoft.com/office/drawing/2014/main" id="{AB121092-1A4E-B913-58D7-618C60930589}"/>
+              </a:ext>
+            </a:extLst>
+          </p:cNvPr>
+          <p:cNvSpPr>
+            <a:spLocks noGrp="1"/>
+          </p:cNvSpPr>
+          <p:nvPr>
+            <p:ph type="title"/>
+          </p:nvPr>
+        </p:nvSpPr>
+        <p:spPr/>
+        <p:txBody>
+          <a:bodyPr/>
+          <a:lstStyle/>
+          <a:p>
+            <a:r>
+              <a:rPr lang="de-DE" dirty="0"/>
+              <a:t>PWM-Signal</a:t>
+            </a:r>
+          </a:p>
+        </p:txBody>
+      </p:sp>
+      <p:pic>
+        <p:nvPicPr>
+          <p:cNvPr id="7" name="Inhaltsplatzhalter 6">
+            <a:extLst>
+              <a:ext uri="{FF2B5EF4-FFF2-40B4-BE49-F238E27FC236}">
+                <a16:creationId xmlns:a16="http://schemas.microsoft.com/office/drawing/2014/main" id="{6F74051A-FEE1-FC61-1580-4C82B02C16A1}"/>
+              </a:ext>
+            </a:extLst>
+          </p:cNvPr>
+          <p:cNvPicPr>
+            <a:picLocks noGrp="1" noChangeAspect="1"/>
+          </p:cNvPicPr>
+          <p:nvPr>
+            <p:ph idx="1"/>
+          </p:nvPr>
+        </p:nvPicPr>
+        <p:blipFill>
+          <a:blip r:embed="rId2">
+            <a:extLst>
+              <a:ext uri="{28A0092B-C50C-407E-A947-70E740481C1C}">
+                <a14:useLocalDpi xmlns:a14="http://schemas.microsoft.com/office/drawing/2010/main" val="0"/>
+              </a:ext>
+            </a:extLst>
+          </a:blip>
+          <a:stretch>
+            <a:fillRect/>
+          </a:stretch>
+        </p:blipFill>
+        <p:spPr>
+          <a:xfrm>
+            <a:off x="2635691" y="1825625"/>
+            <a:ext cx="6920617" cy="4351338"/>
+          </a:xfrm>
+          <a:prstGeom prst="rect">
+            <a:avLst/>
+          </a:prstGeom>
+        </p:spPr>
+      </p:pic>
+      <p:sp>
+        <p:nvSpPr>
+          <p:cNvPr id="9" name="Textfeld 8">
+            <a:extLst>
+              <a:ext uri="{FF2B5EF4-FFF2-40B4-BE49-F238E27FC236}">
+                <a16:creationId xmlns:a16="http://schemas.microsoft.com/office/drawing/2014/main" id="{1DF8DED5-DC6C-BFDA-8ADA-BE438529707E}"/>
+              </a:ext>
+            </a:extLst>
+          </p:cNvPr>
+          <p:cNvSpPr txBox="1"/>
+          <p:nvPr/>
+        </p:nvSpPr>
+        <p:spPr>
+          <a:xfrm>
+            <a:off x="2073815" y="6218302"/>
+            <a:ext cx="8044367" cy="369332"/>
+          </a:xfrm>
+          <a:prstGeom prst="rect">
+            <a:avLst/>
+          </a:prstGeom>
+          <a:noFill/>
+        </p:spPr>
+        <p:txBody>
+          <a:bodyPr wrap="square">
+            <a:spAutoFit/>
+          </a:bodyPr>
+          <a:lstStyle/>
+          <a:p>
+            <a:pPr algn="ctr"/>
+            <a:r>
+              <a:rPr lang="de-DE" dirty="0" err="1"/>
+              <a:t>Scope</a:t>
+            </a:r>
+            <a:r>
+              <a:rPr lang="de-DE" dirty="0"/>
+              <a:t> zeigt das PWM-Signal mit einem eingestellten Duty-Cycle von 50 %</a:t>
+            </a:r>
+          </a:p>
+        </p:txBody>
+      </p:sp>
+    </p:spTree>
+    <p:extLst>
+      <p:ext uri="{BB962C8B-B14F-4D97-AF65-F5344CB8AC3E}">
+        <p14:creationId xmlns:p14="http://schemas.microsoft.com/office/powerpoint/2010/main" val="1031473451"/>
+      </p:ext>
+    </p:extLst>
+  </p:cSld>
+  <p:clrMapOvr>
+    <a:masterClrMapping/>
+  </p:clrMapOvr>
+</p:sld>
+</file>
+
 <file path=ppt/theme/theme1.xml><?xml version="1.0" encoding="utf-8"?>
 <a:theme xmlns:a="http://schemas.openxmlformats.org/drawingml/2006/main" name="Office">
   <a:themeElements>

</xml_diff>

<commit_message>
PP ADC änderungen , USAR und Bit auflösungen
</commit_message>
<xml_diff>
--- a/PowerPoint Doku.pptx
+++ b/PowerPoint Doku.pptx
@@ -10,6 +10,7 @@
     <p:sldId id="258" r:id="rId4"/>
     <p:sldId id="259" r:id="rId5"/>
     <p:sldId id="260" r:id="rId6"/>
+    <p:sldId id="261" r:id="rId7"/>
   </p:sldIdLst>
   <p:sldSz cx="12192000" cy="6858000"/>
   <p:notesSz cx="6858000" cy="9144000"/>
@@ -263,7 +264,7 @@
           <a:p>
             <a:fld id="{0EB00B2A-D511-467E-A405-99BA8CFAAC58}" type="datetimeFigureOut">
               <a:rPr lang="de-DE" smtClean="0"/>
-              <a:t>25.05.2022</a:t>
+              <a:t>27.05.2022</a:t>
             </a:fld>
             <a:endParaRPr lang="de-DE"/>
           </a:p>
@@ -461,7 +462,7 @@
           <a:p>
             <a:fld id="{0EB00B2A-D511-467E-A405-99BA8CFAAC58}" type="datetimeFigureOut">
               <a:rPr lang="de-DE" smtClean="0"/>
-              <a:t>25.05.2022</a:t>
+              <a:t>27.05.2022</a:t>
             </a:fld>
             <a:endParaRPr lang="de-DE"/>
           </a:p>
@@ -669,7 +670,7 @@
           <a:p>
             <a:fld id="{0EB00B2A-D511-467E-A405-99BA8CFAAC58}" type="datetimeFigureOut">
               <a:rPr lang="de-DE" smtClean="0"/>
-              <a:t>25.05.2022</a:t>
+              <a:t>27.05.2022</a:t>
             </a:fld>
             <a:endParaRPr lang="de-DE"/>
           </a:p>
@@ -867,7 +868,7 @@
           <a:p>
             <a:fld id="{0EB00B2A-D511-467E-A405-99BA8CFAAC58}" type="datetimeFigureOut">
               <a:rPr lang="de-DE" smtClean="0"/>
-              <a:t>25.05.2022</a:t>
+              <a:t>27.05.2022</a:t>
             </a:fld>
             <a:endParaRPr lang="de-DE"/>
           </a:p>
@@ -1142,7 +1143,7 @@
           <a:p>
             <a:fld id="{0EB00B2A-D511-467E-A405-99BA8CFAAC58}" type="datetimeFigureOut">
               <a:rPr lang="de-DE" smtClean="0"/>
-              <a:t>25.05.2022</a:t>
+              <a:t>27.05.2022</a:t>
             </a:fld>
             <a:endParaRPr lang="de-DE"/>
           </a:p>
@@ -1407,7 +1408,7 @@
           <a:p>
             <a:fld id="{0EB00B2A-D511-467E-A405-99BA8CFAAC58}" type="datetimeFigureOut">
               <a:rPr lang="de-DE" smtClean="0"/>
-              <a:t>25.05.2022</a:t>
+              <a:t>27.05.2022</a:t>
             </a:fld>
             <a:endParaRPr lang="de-DE"/>
           </a:p>
@@ -1819,7 +1820,7 @@
           <a:p>
             <a:fld id="{0EB00B2A-D511-467E-A405-99BA8CFAAC58}" type="datetimeFigureOut">
               <a:rPr lang="de-DE" smtClean="0"/>
-              <a:t>25.05.2022</a:t>
+              <a:t>27.05.2022</a:t>
             </a:fld>
             <a:endParaRPr lang="de-DE"/>
           </a:p>
@@ -1960,7 +1961,7 @@
           <a:p>
             <a:fld id="{0EB00B2A-D511-467E-A405-99BA8CFAAC58}" type="datetimeFigureOut">
               <a:rPr lang="de-DE" smtClean="0"/>
-              <a:t>25.05.2022</a:t>
+              <a:t>27.05.2022</a:t>
             </a:fld>
             <a:endParaRPr lang="de-DE"/>
           </a:p>
@@ -2073,7 +2074,7 @@
           <a:p>
             <a:fld id="{0EB00B2A-D511-467E-A405-99BA8CFAAC58}" type="datetimeFigureOut">
               <a:rPr lang="de-DE" smtClean="0"/>
-              <a:t>25.05.2022</a:t>
+              <a:t>27.05.2022</a:t>
             </a:fld>
             <a:endParaRPr lang="de-DE"/>
           </a:p>
@@ -2384,7 +2385,7 @@
           <a:p>
             <a:fld id="{0EB00B2A-D511-467E-A405-99BA8CFAAC58}" type="datetimeFigureOut">
               <a:rPr lang="de-DE" smtClean="0"/>
-              <a:t>25.05.2022</a:t>
+              <a:t>27.05.2022</a:t>
             </a:fld>
             <a:endParaRPr lang="de-DE"/>
           </a:p>
@@ -2672,7 +2673,7 @@
           <a:p>
             <a:fld id="{0EB00B2A-D511-467E-A405-99BA8CFAAC58}" type="datetimeFigureOut">
               <a:rPr lang="de-DE" smtClean="0"/>
-              <a:t>25.05.2022</a:t>
+              <a:t>27.05.2022</a:t>
             </a:fld>
             <a:endParaRPr lang="de-DE"/>
           </a:p>
@@ -2913,7 +2914,7 @@
           <a:p>
             <a:fld id="{0EB00B2A-D511-467E-A405-99BA8CFAAC58}" type="datetimeFigureOut">
               <a:rPr lang="de-DE" smtClean="0"/>
-              <a:t>25.05.2022</a:t>
+              <a:t>27.05.2022</a:t>
             </a:fld>
             <a:endParaRPr lang="de-DE"/>
           </a:p>
@@ -3463,8 +3464,8 @@
         </p:nvSpPr>
         <p:spPr>
           <a:xfrm>
-            <a:off x="1828800" y="2667786"/>
-            <a:ext cx="7654565" cy="369332"/>
+            <a:off x="838200" y="2215299"/>
+            <a:ext cx="7654565" cy="3354765"/>
           </a:xfrm>
           <a:prstGeom prst="rect">
             <a:avLst/>
@@ -3477,10 +3478,110 @@
           </a:bodyPr>
           <a:lstStyle/>
           <a:p>
-            <a:r>
-              <a:rPr lang="de-DE" dirty="0"/>
-              <a:t>Hier Bild einfügen</a:t>
-            </a:r>
+            <a:pPr marL="285750" indent="-285750">
+              <a:buFont typeface="Arial" panose="020B0604020202020204" pitchFamily="34" charset="0"/>
+              <a:buChar char="•"/>
+            </a:pPr>
+            <a:r>
+              <a:rPr lang="de-DE" sz="2800" dirty="0"/>
+              <a:t>Output on PIN ..  bei </a:t>
+            </a:r>
+            <a:r>
+              <a:rPr lang="de-DE" sz="2800" dirty="0" err="1"/>
+              <a:t>interrupt</a:t>
+            </a:r>
+            <a:r>
+              <a:rPr lang="de-DE" sz="2800" dirty="0"/>
+              <a:t> </a:t>
+            </a:r>
+            <a:r>
+              <a:rPr lang="de-DE" sz="2800" dirty="0" err="1"/>
+              <a:t>start</a:t>
+            </a:r>
+            <a:endParaRPr lang="de-DE" sz="2800" dirty="0"/>
+          </a:p>
+          <a:p>
+            <a:pPr marL="285750" indent="-285750">
+              <a:buFont typeface="Arial" panose="020B0604020202020204" pitchFamily="34" charset="0"/>
+              <a:buChar char="•"/>
+            </a:pPr>
+            <a:r>
+              <a:rPr lang="de-DE" sz="2800" dirty="0"/>
+              <a:t>Oszilloskop für </a:t>
+            </a:r>
+            <a:r>
+              <a:rPr lang="de-DE" sz="2800" dirty="0" err="1"/>
+              <a:t>zeitmessung</a:t>
+            </a:r>
+            <a:endParaRPr lang="de-DE" sz="2800" dirty="0"/>
+          </a:p>
+          <a:p>
+            <a:pPr marL="285750" indent="-285750">
+              <a:buFont typeface="Arial" panose="020B0604020202020204" pitchFamily="34" charset="0"/>
+              <a:buChar char="•"/>
+            </a:pPr>
+            <a:r>
+              <a:rPr lang="de-DE" sz="2800" dirty="0"/>
+              <a:t>Erster Test 482*10-6 s, 14 Hz</a:t>
+            </a:r>
+          </a:p>
+          <a:p>
+            <a:pPr marL="285750" indent="-285750">
+              <a:buFont typeface="Arial" panose="020B0604020202020204" pitchFamily="34" charset="0"/>
+              <a:buChar char="•"/>
+            </a:pPr>
+            <a:r>
+              <a:rPr lang="de-DE" sz="2800" dirty="0"/>
+              <a:t>Zyklusdauer musst </a:t>
+            </a:r>
+            <a:r>
+              <a:rPr lang="de-DE" sz="2800" dirty="0" err="1"/>
+              <a:t>vlt</a:t>
+            </a:r>
+            <a:r>
+              <a:rPr lang="de-DE" sz="2800" dirty="0"/>
+              <a:t> noch reduziert werden, alle 71 </a:t>
+            </a:r>
+            <a:r>
+              <a:rPr lang="de-DE" sz="2800" dirty="0" err="1"/>
+              <a:t>ms</a:t>
+            </a:r>
+            <a:r>
+              <a:rPr lang="de-DE" sz="2800" dirty="0"/>
+              <a:t> ist </a:t>
+            </a:r>
+            <a:r>
+              <a:rPr lang="de-DE" sz="2800" dirty="0" err="1"/>
+              <a:t>evt.</a:t>
+            </a:r>
+            <a:r>
+              <a:rPr lang="de-DE" sz="2800" dirty="0"/>
+              <a:t> Etwas selten</a:t>
+            </a:r>
+          </a:p>
+          <a:p>
+            <a:pPr marL="285750" indent="-285750">
+              <a:buFont typeface="Arial" panose="020B0604020202020204" pitchFamily="34" charset="0"/>
+              <a:buChar char="•"/>
+            </a:pPr>
+            <a:endParaRPr lang="de-DE" dirty="0"/>
+          </a:p>
+          <a:p>
+            <a:pPr marL="285750" indent="-285750">
+              <a:buFont typeface="Arial" panose="020B0604020202020204" pitchFamily="34" charset="0"/>
+              <a:buChar char="•"/>
+            </a:pPr>
+            <a:endParaRPr lang="de-DE" dirty="0"/>
+          </a:p>
+          <a:p>
+            <a:pPr marL="285750" indent="-285750">
+              <a:buFont typeface="Arial" panose="020B0604020202020204" pitchFamily="34" charset="0"/>
+              <a:buChar char="•"/>
+            </a:pPr>
+            <a:endParaRPr lang="de-DE" dirty="0"/>
+          </a:p>
+          <a:p>
+            <a:endParaRPr lang="de-DE" dirty="0"/>
           </a:p>
         </p:txBody>
       </p:sp>
@@ -3568,7 +3669,9 @@
         </p:nvSpPr>
         <p:spPr/>
         <p:txBody>
-          <a:bodyPr/>
+          <a:bodyPr>
+            <a:normAutofit/>
+          </a:bodyPr>
           <a:lstStyle/>
           <a:p>
             <a:r>
@@ -3593,6 +3696,40 @@
             </a:r>
           </a:p>
           <a:p>
+            <a:r>
+              <a:rPr lang="de-DE" dirty="0">
+                <a:sym typeface="Wingdings" panose="05000000000000000000" pitchFamily="2" charset="2"/>
+              </a:rPr>
+              <a:t>Anpassen der Anfangs und Endwerte damit kein Underflow</a:t>
+            </a:r>
+          </a:p>
+          <a:p>
+            <a:r>
+              <a:rPr lang="de-DE" dirty="0" err="1">
+                <a:sym typeface="Wingdings" panose="05000000000000000000" pitchFamily="2" charset="2"/>
+              </a:rPr>
+              <a:t>Meanwertberechnung</a:t>
+            </a:r>
+            <a:r>
+              <a:rPr lang="de-DE" dirty="0">
+                <a:sym typeface="Wingdings" panose="05000000000000000000" pitchFamily="2" charset="2"/>
+              </a:rPr>
+              <a:t> aus beiden </a:t>
+            </a:r>
+            <a:r>
+              <a:rPr lang="de-DE" dirty="0" err="1">
+                <a:sym typeface="Wingdings" panose="05000000000000000000" pitchFamily="2" charset="2"/>
+              </a:rPr>
+              <a:t>pottis</a:t>
+            </a:r>
+            <a:r>
+              <a:rPr lang="de-DE" dirty="0">
+                <a:sym typeface="Wingdings" panose="05000000000000000000" pitchFamily="2" charset="2"/>
+              </a:rPr>
+              <a:t> für hohe Genauigkeit</a:t>
+            </a:r>
+          </a:p>
+          <a:p>
             <a:endParaRPr lang="de-DE" dirty="0">
               <a:sym typeface="Wingdings" panose="05000000000000000000" pitchFamily="2" charset="2"/>
             </a:endParaRPr>
@@ -3610,13 +3747,19 @@
               <a:rPr lang="de-DE" dirty="0">
                 <a:sym typeface="Wingdings" panose="05000000000000000000" pitchFamily="2" charset="2"/>
               </a:rPr>
-              <a:t>ADC Teilung wird von 64 auf </a:t>
-            </a:r>
-            <a:r>
-              <a:rPr lang="de-DE">
+              <a:t>ADC Teilung bleib gleich da nur </a:t>
+            </a:r>
+            <a:r>
+              <a:rPr lang="de-DE" dirty="0" err="1">
                 <a:sym typeface="Wingdings" panose="05000000000000000000" pitchFamily="2" charset="2"/>
               </a:rPr>
-              <a:t>16 reduziert</a:t>
+              <a:t>genauigkeit</a:t>
+            </a:r>
+            <a:r>
+              <a:rPr lang="de-DE" dirty="0">
+                <a:sym typeface="Wingdings" panose="05000000000000000000" pitchFamily="2" charset="2"/>
+              </a:rPr>
+              <a:t> beeinflusst</a:t>
             </a:r>
           </a:p>
         </p:txBody>
@@ -3709,6 +3852,36 @@
             <p:txBody>
               <a:bodyPr/>
               <a:lstStyle/>
+              <a:p>
+                <a:pPr/>
+                <a:r>
+                  <a:rPr lang="de-DE" b="0" i="1" dirty="0">
+                    <a:latin typeface="Cambria Math" panose="02040503050406030204" pitchFamily="18" charset="0"/>
+                  </a:rPr>
+                  <a:t>Fast PWM, Modus 14-mit </a:t>
+                </a:r>
+                <a:r>
+                  <a:rPr lang="de-DE" b="0" i="1" dirty="0" err="1">
+                    <a:latin typeface="Cambria Math" panose="02040503050406030204" pitchFamily="18" charset="0"/>
+                  </a:rPr>
+                  <a:t>Topvalue</a:t>
+                </a:r>
+                <a:r>
+                  <a:rPr lang="de-DE" b="0" i="1" dirty="0">
+                    <a:latin typeface="Cambria Math" panose="02040503050406030204" pitchFamily="18" charset="0"/>
+                  </a:rPr>
+                  <a:t> ICR1, OCR1A für </a:t>
+                </a:r>
+                <a:r>
+                  <a:rPr lang="de-DE" b="0" i="1" dirty="0" err="1">
+                    <a:latin typeface="Cambria Math" panose="02040503050406030204" pitchFamily="18" charset="0"/>
+                  </a:rPr>
+                  <a:t>Comparevalue</a:t>
+                </a:r>
+                <a:endParaRPr lang="de-DE" b="0" i="1" dirty="0">
+                  <a:latin typeface="Cambria Math" panose="02040503050406030204" pitchFamily="18" charset="0"/>
+                </a:endParaRPr>
+              </a:p>
               <a:p>
                 <a:pPr marL="0" indent="0">
                   <a:buNone/>
@@ -3818,7 +3991,44 @@
                 <a:endParaRPr lang="de-DE" dirty="0"/>
               </a:p>
               <a:p>
-                <a:pPr/>
+                <a:r>
+                  <a:rPr lang="de-DE" dirty="0"/>
+                  <a:t>Clear at </a:t>
+                </a:r>
+                <a:r>
+                  <a:rPr lang="de-DE" dirty="0" err="1"/>
+                  <a:t>compare</a:t>
+                </a:r>
+                <a:r>
+                  <a:rPr lang="de-DE" dirty="0"/>
+                  <a:t> match, non </a:t>
+                </a:r>
+                <a:r>
+                  <a:rPr lang="de-DE" dirty="0" err="1"/>
+                  <a:t>inverting</a:t>
+                </a:r>
+                <a:r>
+                  <a:rPr lang="de-DE" dirty="0"/>
+                  <a:t> </a:t>
+                </a:r>
+                <a:r>
+                  <a:rPr lang="de-DE" dirty="0" err="1"/>
+                  <a:t>mode</a:t>
+                </a:r>
+                <a:r>
+                  <a:rPr lang="de-DE" dirty="0"/>
+                  <a:t>, </a:t>
+                </a:r>
+                <a:r>
+                  <a:rPr lang="de-DE" dirty="0" err="1"/>
+                  <a:t>set</a:t>
+                </a:r>
+                <a:r>
+                  <a:rPr lang="de-DE" dirty="0"/>
+                  <a:t> OCR1A at Bottom</a:t>
+                </a:r>
+              </a:p>
+              <a:p>
                 <a:r>
                   <a:rPr lang="de-DE" dirty="0"/>
                   <a:t>Es wird eine mindestens so gute Auflösung wie bei der AD-Wandlung benötigt </a:t>
@@ -3827,7 +4037,35 @@
                   <a:rPr lang="de-DE" dirty="0">
                     <a:sym typeface="Wingdings" panose="05000000000000000000" pitchFamily="2" charset="2"/>
                   </a:rPr>
-                  <a:t> 11 Bit  TOP = 0x07FF</a:t>
+                  <a:t> 11 Bit  TOP = 0x07FF = 2047 Schritte gesamt</a:t>
+                </a:r>
+              </a:p>
+              <a:p>
+                <a:r>
+                  <a:rPr lang="de-DE" dirty="0">
+                    <a:sym typeface="Wingdings" panose="05000000000000000000" pitchFamily="2" charset="2"/>
+                  </a:rPr>
+                  <a:t>900 Schritte für PWM </a:t>
+                </a:r>
+                <a:r>
+                  <a:rPr lang="de-DE" dirty="0" err="1">
+                    <a:sym typeface="Wingdings" panose="05000000000000000000" pitchFamily="2" charset="2"/>
+                  </a:rPr>
+                  <a:t>Dutycycle</a:t>
+                </a:r>
+                <a:r>
+                  <a:rPr lang="de-DE" dirty="0">
+                    <a:sym typeface="Wingdings" panose="05000000000000000000" pitchFamily="2" charset="2"/>
+                  </a:rPr>
+                  <a:t> höher als 50 %</a:t>
+                </a:r>
+              </a:p>
+              <a:p>
+                <a:r>
+                  <a:rPr lang="de-DE" dirty="0">
+                    <a:sym typeface="Wingdings" panose="05000000000000000000" pitchFamily="2" charset="2"/>
+                  </a:rPr>
+                  <a:t>900 weitere Schritte nötig für PWM kleiner als 50 %</a:t>
                 </a:r>
                 <a:endParaRPr lang="de-DE" dirty="0"/>
               </a:p>
@@ -3869,7 +4107,7 @@
               <a:blipFill>
                 <a:blip r:embed="rId2"/>
                 <a:stretch>
-                  <a:fillRect l="-1043" r="-290"/>
+                  <a:fillRect l="-1043" t="-2381" r="-696" b="-560"/>
                 </a:stretch>
               </a:blipFill>
             </p:spPr>
@@ -4028,6 +4266,150 @@
     <p:extLst>
       <p:ext uri="{BB962C8B-B14F-4D97-AF65-F5344CB8AC3E}">
         <p14:creationId xmlns:p14="http://schemas.microsoft.com/office/powerpoint/2010/main" val="1031473451"/>
+      </p:ext>
+    </p:extLst>
+  </p:cSld>
+  <p:clrMapOvr>
+    <a:masterClrMapping/>
+  </p:clrMapOvr>
+</p:sld>
+</file>
+
+<file path=ppt/slides/slide6.xml><?xml version="1.0" encoding="utf-8"?>
+<p:sld xmlns:a="http://schemas.openxmlformats.org/drawingml/2006/main" xmlns:r="http://schemas.openxmlformats.org/officeDocument/2006/relationships" xmlns:p="http://schemas.openxmlformats.org/presentationml/2006/main">
+  <p:cSld>
+    <p:spTree>
+      <p:nvGrpSpPr>
+        <p:cNvPr id="1" name=""/>
+        <p:cNvGrpSpPr/>
+        <p:nvPr/>
+      </p:nvGrpSpPr>
+      <p:grpSpPr>
+        <a:xfrm>
+          <a:off x="0" y="0"/>
+          <a:ext cx="0" cy="0"/>
+          <a:chOff x="0" y="0"/>
+          <a:chExt cx="0" cy="0"/>
+        </a:xfrm>
+      </p:grpSpPr>
+      <p:sp>
+        <p:nvSpPr>
+          <p:cNvPr id="2" name="Titel 1">
+            <a:extLst>
+              <a:ext uri="{FF2B5EF4-FFF2-40B4-BE49-F238E27FC236}">
+                <a16:creationId xmlns:a16="http://schemas.microsoft.com/office/drawing/2014/main" id="{FFD14627-06F0-11D3-DAA6-B5C6A136D79E}"/>
+              </a:ext>
+            </a:extLst>
+          </p:cNvPr>
+          <p:cNvSpPr>
+            <a:spLocks noGrp="1"/>
+          </p:cNvSpPr>
+          <p:nvPr>
+            <p:ph type="title"/>
+          </p:nvPr>
+        </p:nvSpPr>
+        <p:spPr/>
+        <p:txBody>
+          <a:bodyPr/>
+          <a:lstStyle/>
+          <a:p>
+            <a:r>
+              <a:rPr lang="de-DE" dirty="0"/>
+              <a:t>Schnittstelle USART</a:t>
+            </a:r>
+          </a:p>
+        </p:txBody>
+      </p:sp>
+      <p:sp>
+        <p:nvSpPr>
+          <p:cNvPr id="3" name="Inhaltsplatzhalter 2">
+            <a:extLst>
+              <a:ext uri="{FF2B5EF4-FFF2-40B4-BE49-F238E27FC236}">
+                <a16:creationId xmlns:a16="http://schemas.microsoft.com/office/drawing/2014/main" id="{4959EC5E-2B49-A5A6-083A-D568CCB6F804}"/>
+              </a:ext>
+            </a:extLst>
+          </p:cNvPr>
+          <p:cNvSpPr>
+            <a:spLocks noGrp="1"/>
+          </p:cNvSpPr>
+          <p:nvPr>
+            <p:ph idx="1"/>
+          </p:nvPr>
+        </p:nvSpPr>
+        <p:spPr/>
+        <p:txBody>
+          <a:bodyPr/>
+          <a:lstStyle/>
+          <a:p>
+            <a:r>
+              <a:rPr lang="de-DE" dirty="0"/>
+              <a:t>Auf 16 </a:t>
+            </a:r>
+            <a:r>
+              <a:rPr lang="de-DE" dirty="0" err="1"/>
+              <a:t>bit</a:t>
+            </a:r>
+            <a:r>
+              <a:rPr lang="de-DE" dirty="0"/>
+              <a:t> umgestellt</a:t>
+            </a:r>
+          </a:p>
+          <a:p>
+            <a:r>
+              <a:rPr lang="de-DE" dirty="0"/>
+              <a:t>Daten werden als zwei 8-bit </a:t>
+            </a:r>
+            <a:r>
+              <a:rPr lang="de-DE" dirty="0" err="1"/>
+              <a:t>pakete</a:t>
+            </a:r>
+            <a:r>
+              <a:rPr lang="de-DE" dirty="0"/>
+              <a:t> geschickt</a:t>
+            </a:r>
+          </a:p>
+          <a:p>
+            <a:r>
+              <a:rPr lang="de-DE" dirty="0"/>
+              <a:t>Erst </a:t>
+            </a:r>
+            <a:r>
+              <a:rPr lang="de-DE" dirty="0" err="1"/>
+              <a:t>low</a:t>
+            </a:r>
+            <a:r>
+              <a:rPr lang="de-DE" dirty="0"/>
+              <a:t> dann high </a:t>
+            </a:r>
+            <a:r>
+              <a:rPr lang="de-DE" dirty="0" err="1"/>
+              <a:t>bit</a:t>
+            </a:r>
+            <a:r>
+              <a:rPr lang="de-DE" dirty="0"/>
+              <a:t>, dass keine </a:t>
+            </a:r>
+            <a:r>
+              <a:rPr lang="de-DE" dirty="0" err="1"/>
+              <a:t>peaks</a:t>
+            </a:r>
+            <a:r>
+              <a:rPr lang="de-DE" dirty="0"/>
+              <a:t> bei 255 *n entstehen</a:t>
+            </a:r>
+          </a:p>
+          <a:p>
+            <a:pPr marL="0" indent="0">
+              <a:buNone/>
+            </a:pPr>
+            <a:endParaRPr lang="de-DE" dirty="0"/>
+          </a:p>
+        </p:txBody>
+      </p:sp>
+    </p:spTree>
+    <p:extLst>
+      <p:ext uri="{BB962C8B-B14F-4D97-AF65-F5344CB8AC3E}">
+        <p14:creationId xmlns:p14="http://schemas.microsoft.com/office/powerpoint/2010/main" val="3950225286"/>
       </p:ext>
     </p:extLst>
   </p:cSld>

</xml_diff>